<commit_message>
clean 5 experiments for 062022 ppt
</commit_message>
<xml_diff>
--- a/Experiments/LennaBWOrig.pptx
+++ b/Experiments/LennaBWOrig.pptx
@@ -6,12 +6,13 @@
   </p:sldMasterIdLst>
   <p:sldIdLst>
     <p:sldId id="256" r:id="rId2"/>
-    <p:sldId id="257" r:id="rId3"/>
-    <p:sldId id="258" r:id="rId4"/>
-    <p:sldId id="260" r:id="rId5"/>
-    <p:sldId id="259" r:id="rId6"/>
-    <p:sldId id="261" r:id="rId7"/>
-    <p:sldId id="262" r:id="rId8"/>
+    <p:sldId id="263" r:id="rId3"/>
+    <p:sldId id="257" r:id="rId4"/>
+    <p:sldId id="258" r:id="rId5"/>
+    <p:sldId id="260" r:id="rId6"/>
+    <p:sldId id="259" r:id="rId7"/>
+    <p:sldId id="261" r:id="rId8"/>
+    <p:sldId id="262" r:id="rId9"/>
   </p:sldIdLst>
   <p:sldSz cx="12192000" cy="6858000"/>
   <p:notesSz cx="6858000" cy="9144000"/>
@@ -265,7 +266,7 @@
           <a:p>
             <a:fld id="{1F411E57-2E19-4551-BB1B-C937B0A1718A}" type="datetimeFigureOut">
               <a:rPr lang="en-US" smtClean="0"/>
-              <a:t>5/28/2022</a:t>
+              <a:t>6/5/2022</a:t>
             </a:fld>
             <a:endParaRPr lang="en-US"/>
           </a:p>
@@ -463,7 +464,7 @@
           <a:p>
             <a:fld id="{1F411E57-2E19-4551-BB1B-C937B0A1718A}" type="datetimeFigureOut">
               <a:rPr lang="en-US" smtClean="0"/>
-              <a:t>5/28/2022</a:t>
+              <a:t>6/5/2022</a:t>
             </a:fld>
             <a:endParaRPr lang="en-US"/>
           </a:p>
@@ -671,7 +672,7 @@
           <a:p>
             <a:fld id="{1F411E57-2E19-4551-BB1B-C937B0A1718A}" type="datetimeFigureOut">
               <a:rPr lang="en-US" smtClean="0"/>
-              <a:t>5/28/2022</a:t>
+              <a:t>6/5/2022</a:t>
             </a:fld>
             <a:endParaRPr lang="en-US"/>
           </a:p>
@@ -869,7 +870,7 @@
           <a:p>
             <a:fld id="{1F411E57-2E19-4551-BB1B-C937B0A1718A}" type="datetimeFigureOut">
               <a:rPr lang="en-US" smtClean="0"/>
-              <a:t>5/28/2022</a:t>
+              <a:t>6/5/2022</a:t>
             </a:fld>
             <a:endParaRPr lang="en-US"/>
           </a:p>
@@ -1144,7 +1145,7 @@
           <a:p>
             <a:fld id="{1F411E57-2E19-4551-BB1B-C937B0A1718A}" type="datetimeFigureOut">
               <a:rPr lang="en-US" smtClean="0"/>
-              <a:t>5/28/2022</a:t>
+              <a:t>6/5/2022</a:t>
             </a:fld>
             <a:endParaRPr lang="en-US"/>
           </a:p>
@@ -1409,7 +1410,7 @@
           <a:p>
             <a:fld id="{1F411E57-2E19-4551-BB1B-C937B0A1718A}" type="datetimeFigureOut">
               <a:rPr lang="en-US" smtClean="0"/>
-              <a:t>5/28/2022</a:t>
+              <a:t>6/5/2022</a:t>
             </a:fld>
             <a:endParaRPr lang="en-US"/>
           </a:p>
@@ -1821,7 +1822,7 @@
           <a:p>
             <a:fld id="{1F411E57-2E19-4551-BB1B-C937B0A1718A}" type="datetimeFigureOut">
               <a:rPr lang="en-US" smtClean="0"/>
-              <a:t>5/28/2022</a:t>
+              <a:t>6/5/2022</a:t>
             </a:fld>
             <a:endParaRPr lang="en-US"/>
           </a:p>
@@ -1962,7 +1963,7 @@
           <a:p>
             <a:fld id="{1F411E57-2E19-4551-BB1B-C937B0A1718A}" type="datetimeFigureOut">
               <a:rPr lang="en-US" smtClean="0"/>
-              <a:t>5/28/2022</a:t>
+              <a:t>6/5/2022</a:t>
             </a:fld>
             <a:endParaRPr lang="en-US"/>
           </a:p>
@@ -2075,7 +2076,7 @@
           <a:p>
             <a:fld id="{1F411E57-2E19-4551-BB1B-C937B0A1718A}" type="datetimeFigureOut">
               <a:rPr lang="en-US" smtClean="0"/>
-              <a:t>5/28/2022</a:t>
+              <a:t>6/5/2022</a:t>
             </a:fld>
             <a:endParaRPr lang="en-US"/>
           </a:p>
@@ -2386,7 +2387,7 @@
           <a:p>
             <a:fld id="{1F411E57-2E19-4551-BB1B-C937B0A1718A}" type="datetimeFigureOut">
               <a:rPr lang="en-US" smtClean="0"/>
-              <a:t>5/28/2022</a:t>
+              <a:t>6/5/2022</a:t>
             </a:fld>
             <a:endParaRPr lang="en-US"/>
           </a:p>
@@ -2674,7 +2675,7 @@
           <a:p>
             <a:fld id="{1F411E57-2E19-4551-BB1B-C937B0A1718A}" type="datetimeFigureOut">
               <a:rPr lang="en-US" smtClean="0"/>
-              <a:t>5/28/2022</a:t>
+              <a:t>6/5/2022</a:t>
             </a:fld>
             <a:endParaRPr lang="en-US"/>
           </a:p>
@@ -2915,7 +2916,7 @@
           <a:p>
             <a:fld id="{1F411E57-2E19-4551-BB1B-C937B0A1718A}" type="datetimeFigureOut">
               <a:rPr lang="en-US" smtClean="0"/>
-              <a:t>5/28/2022</a:t>
+              <a:t>6/5/2022</a:t>
             </a:fld>
             <a:endParaRPr lang="en-US"/>
           </a:p>
@@ -3357,18 +3358,14 @@
           <a:p>
             <a:r>
               <a:rPr lang="en-US" dirty="0"/>
-              <a:t>Experiment:</a:t>
+              <a:t>Experiment4A:</a:t>
             </a:r>
             <a:br>
               <a:rPr lang="en-US" dirty="0"/>
             </a:br>
             <a:r>
-              <a:rPr lang="en-US"/>
-              <a:t>Identical Target </a:t>
-            </a:r>
-            <a:r>
               <a:rPr lang="en-US" dirty="0"/>
-              <a:t>and Candidate Images</a:t>
+              <a:t>Identical Target and Candidate Images</a:t>
             </a:r>
           </a:p>
         </p:txBody>
@@ -3394,6 +3391,10 @@
           <a:bodyPr/>
           <a:lstStyle/>
           <a:p>
+            <a:r>
+              <a:rPr lang="en-US" dirty="0"/>
+              <a:t>Target and Candidate Image: </a:t>
+            </a:r>
             <a:r>
               <a:rPr lang="en-US" dirty="0" err="1"/>
               <a:t>LennaBWOrig</a:t>
@@ -3455,7 +3456,7 @@
           <a:p>
             <a:r>
               <a:rPr lang="en-US" dirty="0"/>
-              <a:t>bsquare40x40_wqs10x10</a:t>
+              <a:t>Lenna.jpg</a:t>
             </a:r>
           </a:p>
         </p:txBody>
@@ -3483,7 +3484,219 @@
           <a:p>
             <a:r>
               <a:rPr lang="en-US" dirty="0"/>
-              <a:t>compare images result image: LennaBWOrig.jpeg, </a:t>
+              <a:t>compare images result image: images/Lenna.png, Positive </a:t>
+            </a:r>
+            <a:r>
+              <a:rPr lang="en-US" dirty="0" err="1"/>
+              <a:t>cimage</a:t>
+            </a:r>
+            <a:r>
+              <a:rPr lang="en-US" dirty="0"/>
+              <a:t>: </a:t>
+            </a:r>
+            <a:r>
+              <a:rPr lang="en-US" dirty="0" err="1"/>
+              <a:t>out_images</a:t>
+            </a:r>
+            <a:r>
+              <a:rPr lang="en-US" dirty="0"/>
+              <a:t>/Lenna_R_P.png, </a:t>
+            </a:r>
+            <a:r>
+              <a:rPr lang="en-US" dirty="0" err="1"/>
+              <a:t>match_pixel_count</a:t>
+            </a:r>
+            <a:r>
+              <a:rPr lang="en-US" dirty="0"/>
+              <a:t>: </a:t>
+            </a:r>
+            <a:r>
+              <a:rPr lang="en-US" b="1" dirty="0"/>
+              <a:t>126965</a:t>
+            </a:r>
+            <a:r>
+              <a:rPr lang="en-US" dirty="0"/>
+              <a:t>, </a:t>
+            </a:r>
+            <a:r>
+              <a:rPr lang="en-US" dirty="0" err="1"/>
+              <a:t>mismatch_pixel_count</a:t>
+            </a:r>
+            <a:r>
+              <a:rPr lang="en-US" dirty="0"/>
+              <a:t>: </a:t>
+            </a:r>
+            <a:r>
+              <a:rPr lang="en-US" b="1" dirty="0"/>
+              <a:t>0</a:t>
+            </a:r>
+            <a:r>
+              <a:rPr lang="en-US" dirty="0"/>
+              <a:t>, </a:t>
+            </a:r>
+            <a:r>
+              <a:rPr lang="en-US" dirty="0" err="1"/>
+              <a:t>total_pixels</a:t>
+            </a:r>
+            <a:r>
+              <a:rPr lang="en-US" dirty="0"/>
+              <a:t>: 262144, match percentage: </a:t>
+            </a:r>
+            <a:r>
+              <a:rPr lang="en-US" b="1" dirty="0"/>
+              <a:t>48.43%</a:t>
+            </a:r>
+          </a:p>
+          <a:p>
+            <a:r>
+              <a:rPr lang="en-US" dirty="0"/>
+              <a:t>compare images result image: images/Lenna.png, Negative </a:t>
+            </a:r>
+            <a:r>
+              <a:rPr lang="en-US" dirty="0" err="1"/>
+              <a:t>cimage</a:t>
+            </a:r>
+            <a:r>
+              <a:rPr lang="en-US" dirty="0"/>
+              <a:t>: </a:t>
+            </a:r>
+            <a:r>
+              <a:rPr lang="en-US" dirty="0" err="1"/>
+              <a:t>out_images</a:t>
+            </a:r>
+            <a:r>
+              <a:rPr lang="en-US" dirty="0"/>
+              <a:t>/Lenna_R_N.png, </a:t>
+            </a:r>
+            <a:r>
+              <a:rPr lang="en-US" dirty="0" err="1"/>
+              <a:t>match_pixel_count</a:t>
+            </a:r>
+            <a:r>
+              <a:rPr lang="en-US" dirty="0"/>
+              <a:t>: </a:t>
+            </a:r>
+            <a:r>
+              <a:rPr lang="en-US" b="1" dirty="0"/>
+              <a:t>135179</a:t>
+            </a:r>
+            <a:r>
+              <a:rPr lang="en-US" dirty="0"/>
+              <a:t>, </a:t>
+            </a:r>
+            <a:r>
+              <a:rPr lang="en-US" dirty="0" err="1"/>
+              <a:t>mismatch_pixel_count</a:t>
+            </a:r>
+            <a:r>
+              <a:rPr lang="en-US" dirty="0"/>
+              <a:t>: </a:t>
+            </a:r>
+            <a:r>
+              <a:rPr lang="en-US" b="1" dirty="0"/>
+              <a:t>0</a:t>
+            </a:r>
+            <a:r>
+              <a:rPr lang="en-US" dirty="0"/>
+              <a:t>, </a:t>
+            </a:r>
+            <a:r>
+              <a:rPr lang="en-US" dirty="0" err="1"/>
+              <a:t>total_pixels</a:t>
+            </a:r>
+            <a:r>
+              <a:rPr lang="en-US" dirty="0"/>
+              <a:t>: 262144, match percentage: </a:t>
+            </a:r>
+            <a:r>
+              <a:rPr lang="en-US" b="1" dirty="0"/>
+              <a:t>51.57%</a:t>
+            </a:r>
+          </a:p>
+        </p:txBody>
+      </p:sp>
+    </p:spTree>
+    <p:extLst>
+      <p:ext uri="{BB962C8B-B14F-4D97-AF65-F5344CB8AC3E}">
+        <p14:creationId xmlns:p14="http://schemas.microsoft.com/office/powerpoint/2010/main" val="1153317"/>
+      </p:ext>
+    </p:extLst>
+  </p:cSld>
+  <p:clrMapOvr>
+    <a:masterClrMapping/>
+  </p:clrMapOvr>
+</p:sld>
+</file>
+
+<file path=ppt/slides/slide3.xml><?xml version="1.0" encoding="utf-8"?>
+<p:sld xmlns:a="http://schemas.openxmlformats.org/drawingml/2006/main" xmlns:r="http://schemas.openxmlformats.org/officeDocument/2006/relationships" xmlns:p="http://schemas.openxmlformats.org/presentationml/2006/main">
+  <p:cSld>
+    <p:spTree>
+      <p:nvGrpSpPr>
+        <p:cNvPr id="1" name=""/>
+        <p:cNvGrpSpPr/>
+        <p:nvPr/>
+      </p:nvGrpSpPr>
+      <p:grpSpPr>
+        <a:xfrm>
+          <a:off x="0" y="0"/>
+          <a:ext cx="0" cy="0"/>
+          <a:chOff x="0" y="0"/>
+          <a:chExt cx="0" cy="0"/>
+        </a:xfrm>
+      </p:grpSpPr>
+      <p:sp>
+        <p:nvSpPr>
+          <p:cNvPr id="2" name="Title 1">
+            <a:extLst>
+              <a:ext uri="{FF2B5EF4-FFF2-40B4-BE49-F238E27FC236}">
+                <a16:creationId xmlns:a16="http://schemas.microsoft.com/office/drawing/2014/main" id="{A62E7561-690C-467C-A150-15A12F4439EA}"/>
+              </a:ext>
+            </a:extLst>
+          </p:cNvPr>
+          <p:cNvSpPr>
+            <a:spLocks noGrp="1"/>
+          </p:cNvSpPr>
+          <p:nvPr>
+            <p:ph type="title"/>
+          </p:nvPr>
+        </p:nvSpPr>
+        <p:spPr/>
+        <p:txBody>
+          <a:bodyPr/>
+          <a:lstStyle/>
+          <a:p>
+            <a:r>
+              <a:rPr lang="en-US" dirty="0"/>
+              <a:t>LennaBWOrig.jpg</a:t>
+            </a:r>
+          </a:p>
+        </p:txBody>
+      </p:sp>
+      <p:sp>
+        <p:nvSpPr>
+          <p:cNvPr id="3" name="Content Placeholder 2">
+            <a:extLst>
+              <a:ext uri="{FF2B5EF4-FFF2-40B4-BE49-F238E27FC236}">
+                <a16:creationId xmlns:a16="http://schemas.microsoft.com/office/drawing/2014/main" id="{5D82A875-98FC-4729-9AB6-4EBF4EBF8F82}"/>
+              </a:ext>
+            </a:extLst>
+          </p:cNvPr>
+          <p:cNvSpPr>
+            <a:spLocks noGrp="1"/>
+          </p:cNvSpPr>
+          <p:nvPr>
+            <p:ph idx="1"/>
+          </p:nvPr>
+        </p:nvSpPr>
+        <p:spPr/>
+        <p:txBody>
+          <a:bodyPr/>
+          <a:lstStyle/>
+          <a:p>
+            <a:r>
+              <a:rPr lang="en-US" dirty="0"/>
+              <a:t>compare images result image: images/LennaBWOrig.jpeg, </a:t>
             </a:r>
             <a:r>
               <a:rPr lang="en-US" b="1" dirty="0"/>
@@ -3499,7 +3712,15 @@
             </a:r>
             <a:r>
               <a:rPr lang="en-US" dirty="0"/>
-              <a:t>: LennaBWOrig.jpeg, </a:t>
+              <a:t>: </a:t>
+            </a:r>
+            <a:r>
+              <a:rPr lang="en-US" dirty="0" err="1"/>
+              <a:t>out_images</a:t>
+            </a:r>
+            <a:r>
+              <a:rPr lang="en-US" dirty="0"/>
+              <a:t>/LennaBWOrig_R_P.png, </a:t>
             </a:r>
             <a:r>
               <a:rPr lang="en-US" dirty="0" err="1"/>
@@ -3511,7 +3732,7 @@
             </a:r>
             <a:r>
               <a:rPr lang="en-US" b="1" dirty="0"/>
-              <a:t>147693</a:t>
+              <a:t>114451</a:t>
             </a:r>
             <a:r>
               <a:rPr lang="en-US" dirty="0"/>
@@ -3519,6 +3740,22 @@
             </a:r>
             <a:r>
               <a:rPr lang="en-US" dirty="0" err="1"/>
+              <a:t>mismatch_pixel_count</a:t>
+            </a:r>
+            <a:r>
+              <a:rPr lang="en-US" dirty="0"/>
+              <a:t>: </a:t>
+            </a:r>
+            <a:r>
+              <a:rPr lang="en-US" b="1" dirty="0"/>
+              <a:t>0</a:t>
+            </a:r>
+            <a:r>
+              <a:rPr lang="en-US" dirty="0"/>
+              <a:t>, </a:t>
+            </a:r>
+            <a:r>
+              <a:rPr lang="en-US" dirty="0" err="1"/>
               <a:t>total_pixels</a:t>
             </a:r>
             <a:r>
@@ -3527,13 +3764,13 @@
             </a:r>
             <a:r>
               <a:rPr lang="en-US" b="1" dirty="0"/>
-              <a:t>56.34%</a:t>
+              <a:t>43.66%</a:t>
             </a:r>
           </a:p>
           <a:p>
             <a:r>
               <a:rPr lang="en-US" dirty="0"/>
-              <a:t>compare images result image: LennaBWOrig.jpeg, </a:t>
+              <a:t>compare images result image: images/LennaBWOrig.jpeg, </a:t>
             </a:r>
             <a:r>
               <a:rPr lang="en-US" b="1" dirty="0"/>
@@ -3549,7 +3786,15 @@
             </a:r>
             <a:r>
               <a:rPr lang="en-US" dirty="0"/>
-              <a:t>: LennaBWOrig.jpeg, </a:t>
+              <a:t>: </a:t>
+            </a:r>
+            <a:r>
+              <a:rPr lang="en-US" dirty="0" err="1"/>
+              <a:t>out_images</a:t>
+            </a:r>
+            <a:r>
+              <a:rPr lang="en-US" dirty="0"/>
+              <a:t>/LennaBWOrig_R_N.png, </a:t>
             </a:r>
             <a:r>
               <a:rPr lang="en-US" dirty="0" err="1"/>
@@ -3561,7 +3806,7 @@
             </a:r>
             <a:r>
               <a:rPr lang="en-US" b="1" dirty="0"/>
-              <a:t>114451</a:t>
+              <a:t>147693</a:t>
             </a:r>
             <a:r>
               <a:rPr lang="en-US" dirty="0"/>
@@ -3569,6 +3814,22 @@
             </a:r>
             <a:r>
               <a:rPr lang="en-US" dirty="0" err="1"/>
+              <a:t>mismatch_pixel_count</a:t>
+            </a:r>
+            <a:r>
+              <a:rPr lang="en-US" dirty="0"/>
+              <a:t>: </a:t>
+            </a:r>
+            <a:r>
+              <a:rPr lang="en-US" b="1" dirty="0"/>
+              <a:t>0</a:t>
+            </a:r>
+            <a:r>
+              <a:rPr lang="en-US" dirty="0"/>
+              <a:t>, </a:t>
+            </a:r>
+            <a:r>
+              <a:rPr lang="en-US" dirty="0" err="1"/>
               <a:t>total_pixels</a:t>
             </a:r>
             <a:r>
@@ -3577,11 +3838,8 @@
             </a:r>
             <a:r>
               <a:rPr lang="en-US" b="1" dirty="0"/>
-              <a:t>43.66%</a:t>
-            </a:r>
-          </a:p>
-          <a:p>
-            <a:endParaRPr lang="en-US" dirty="0"/>
+              <a:t>56.34%</a:t>
+            </a:r>
           </a:p>
         </p:txBody>
       </p:sp>
@@ -3598,7 +3856,7 @@
 </p:sld>
 </file>
 
-<file path=ppt/slides/slide3.xml><?xml version="1.0" encoding="utf-8"?>
+<file path=ppt/slides/slide4.xml><?xml version="1.0" encoding="utf-8"?>
 <p:sld xmlns:a="http://schemas.openxmlformats.org/drawingml/2006/main" xmlns:r="http://schemas.openxmlformats.org/officeDocument/2006/relationships" xmlns:p="http://schemas.openxmlformats.org/presentationml/2006/main">
   <p:cSld>
     <p:spTree>
@@ -3798,7 +4056,7 @@
 </p:sld>
 </file>
 
-<file path=ppt/slides/slide4.xml><?xml version="1.0" encoding="utf-8"?>
+<file path=ppt/slides/slide5.xml><?xml version="1.0" encoding="utf-8"?>
 <p:sld xmlns:a="http://schemas.openxmlformats.org/drawingml/2006/main" xmlns:r="http://schemas.openxmlformats.org/officeDocument/2006/relationships" xmlns:p="http://schemas.openxmlformats.org/presentationml/2006/main">
   <p:cSld>
     <p:spTree>
@@ -4000,7 +4258,7 @@
 </p:sld>
 </file>
 
-<file path=ppt/slides/slide5.xml><?xml version="1.0" encoding="utf-8"?>
+<file path=ppt/slides/slide6.xml><?xml version="1.0" encoding="utf-8"?>
 <p:sld xmlns:a="http://schemas.openxmlformats.org/drawingml/2006/main" xmlns:r="http://schemas.openxmlformats.org/officeDocument/2006/relationships" xmlns:p="http://schemas.openxmlformats.org/presentationml/2006/main">
   <p:cSld>
     <p:spTree>
@@ -4202,7 +4460,7 @@
 </p:sld>
 </file>
 
-<file path=ppt/slides/slide6.xml><?xml version="1.0" encoding="utf-8"?>
+<file path=ppt/slides/slide7.xml><?xml version="1.0" encoding="utf-8"?>
 <p:sld xmlns:a="http://schemas.openxmlformats.org/drawingml/2006/main" xmlns:r="http://schemas.openxmlformats.org/officeDocument/2006/relationships" xmlns:p="http://schemas.openxmlformats.org/presentationml/2006/main">
   <p:cSld>
     <p:spTree>
@@ -4404,7 +4662,7 @@
 </p:sld>
 </file>
 
-<file path=ppt/slides/slide7.xml><?xml version="1.0" encoding="utf-8"?>
+<file path=ppt/slides/slide8.xml><?xml version="1.0" encoding="utf-8"?>
 <p:sld xmlns:a="http://schemas.openxmlformats.org/drawingml/2006/main" xmlns:r="http://schemas.openxmlformats.org/officeDocument/2006/relationships" xmlns:p="http://schemas.openxmlformats.org/presentationml/2006/main">
   <p:cSld>
     <p:spTree>

</xml_diff>